<commit_message>
Added new images and updated Readme.md
</commit_message>
<xml_diff>
--- a/Customer_Service_AgenticApp.pptx
+++ b/Customer_Service_AgenticApp.pptx
@@ -244,7 +244,7 @@
           <a:p>
             <a:fld id="{BC98B4DE-36C4-426A-A868-83AC1393AC8A}" type="datetimeFigureOut">
               <a:rPr lang="en-IN" smtClean="0"/>
-              <a:t>22-11-2025</a:t>
+              <a:t>27-11-2025</a:t>
             </a:fld>
             <a:endParaRPr lang="en-IN"/>
           </a:p>
@@ -414,7 +414,7 @@
           <a:p>
             <a:fld id="{BC98B4DE-36C4-426A-A868-83AC1393AC8A}" type="datetimeFigureOut">
               <a:rPr lang="en-IN" smtClean="0"/>
-              <a:t>22-11-2025</a:t>
+              <a:t>27-11-2025</a:t>
             </a:fld>
             <a:endParaRPr lang="en-IN"/>
           </a:p>
@@ -594,7 +594,7 @@
           <a:p>
             <a:fld id="{BC98B4DE-36C4-426A-A868-83AC1393AC8A}" type="datetimeFigureOut">
               <a:rPr lang="en-IN" smtClean="0"/>
-              <a:t>22-11-2025</a:t>
+              <a:t>27-11-2025</a:t>
             </a:fld>
             <a:endParaRPr lang="en-IN"/>
           </a:p>
@@ -764,7 +764,7 @@
           <a:p>
             <a:fld id="{BC98B4DE-36C4-426A-A868-83AC1393AC8A}" type="datetimeFigureOut">
               <a:rPr lang="en-IN" smtClean="0"/>
-              <a:t>22-11-2025</a:t>
+              <a:t>27-11-2025</a:t>
             </a:fld>
             <a:endParaRPr lang="en-IN"/>
           </a:p>
@@ -1010,7 +1010,7 @@
           <a:p>
             <a:fld id="{BC98B4DE-36C4-426A-A868-83AC1393AC8A}" type="datetimeFigureOut">
               <a:rPr lang="en-IN" smtClean="0"/>
-              <a:t>22-11-2025</a:t>
+              <a:t>27-11-2025</a:t>
             </a:fld>
             <a:endParaRPr lang="en-IN"/>
           </a:p>
@@ -1242,7 +1242,7 @@
           <a:p>
             <a:fld id="{BC98B4DE-36C4-426A-A868-83AC1393AC8A}" type="datetimeFigureOut">
               <a:rPr lang="en-IN" smtClean="0"/>
-              <a:t>22-11-2025</a:t>
+              <a:t>27-11-2025</a:t>
             </a:fld>
             <a:endParaRPr lang="en-IN"/>
           </a:p>
@@ -1609,7 +1609,7 @@
           <a:p>
             <a:fld id="{BC98B4DE-36C4-426A-A868-83AC1393AC8A}" type="datetimeFigureOut">
               <a:rPr lang="en-IN" smtClean="0"/>
-              <a:t>22-11-2025</a:t>
+              <a:t>27-11-2025</a:t>
             </a:fld>
             <a:endParaRPr lang="en-IN"/>
           </a:p>
@@ -1727,7 +1727,7 @@
           <a:p>
             <a:fld id="{BC98B4DE-36C4-426A-A868-83AC1393AC8A}" type="datetimeFigureOut">
               <a:rPr lang="en-IN" smtClean="0"/>
-              <a:t>22-11-2025</a:t>
+              <a:t>27-11-2025</a:t>
             </a:fld>
             <a:endParaRPr lang="en-IN"/>
           </a:p>
@@ -1822,7 +1822,7 @@
           <a:p>
             <a:fld id="{BC98B4DE-36C4-426A-A868-83AC1393AC8A}" type="datetimeFigureOut">
               <a:rPr lang="en-IN" smtClean="0"/>
-              <a:t>22-11-2025</a:t>
+              <a:t>27-11-2025</a:t>
             </a:fld>
             <a:endParaRPr lang="en-IN"/>
           </a:p>
@@ -2099,7 +2099,7 @@
           <a:p>
             <a:fld id="{BC98B4DE-36C4-426A-A868-83AC1393AC8A}" type="datetimeFigureOut">
               <a:rPr lang="en-IN" smtClean="0"/>
-              <a:t>22-11-2025</a:t>
+              <a:t>27-11-2025</a:t>
             </a:fld>
             <a:endParaRPr lang="en-IN"/>
           </a:p>
@@ -2356,7 +2356,7 @@
           <a:p>
             <a:fld id="{BC98B4DE-36C4-426A-A868-83AC1393AC8A}" type="datetimeFigureOut">
               <a:rPr lang="en-IN" smtClean="0"/>
-              <a:t>22-11-2025</a:t>
+              <a:t>27-11-2025</a:t>
             </a:fld>
             <a:endParaRPr lang="en-IN"/>
           </a:p>
@@ -2569,7 +2569,7 @@
           <a:p>
             <a:fld id="{BC98B4DE-36C4-426A-A868-83AC1393AC8A}" type="datetimeFigureOut">
               <a:rPr lang="en-IN" smtClean="0"/>
-              <a:t>22-11-2025</a:t>
+              <a:t>27-11-2025</a:t>
             </a:fld>
             <a:endParaRPr lang="en-IN"/>
           </a:p>
@@ -3225,7 +3225,7 @@
         </p:blipFill>
         <p:spPr>
           <a:xfrm>
-            <a:off x="1510551" y="2664568"/>
+            <a:off x="2620644" y="2671601"/>
             <a:ext cx="582706" cy="582706"/>
           </a:xfrm>
           <a:prstGeom prst="rect">
@@ -3261,7 +3261,7 @@
         </p:blipFill>
         <p:spPr>
           <a:xfrm>
-            <a:off x="3297479" y="2487825"/>
+            <a:off x="3889150" y="2505754"/>
             <a:ext cx="914400" cy="914400"/>
           </a:xfrm>
           <a:prstGeom prst="rect">
@@ -3283,7 +3283,7 @@
         </p:nvSpPr>
         <p:spPr>
           <a:xfrm>
-            <a:off x="1293158" y="3275267"/>
+            <a:off x="2517960" y="3243718"/>
             <a:ext cx="829236" cy="253916"/>
           </a:xfrm>
           <a:prstGeom prst="rect">
@@ -3318,7 +3318,7 @@
         </p:nvSpPr>
         <p:spPr>
           <a:xfrm>
-            <a:off x="3124198" y="3380855"/>
+            <a:off x="3715869" y="3398784"/>
             <a:ext cx="1591236" cy="253916"/>
           </a:xfrm>
           <a:prstGeom prst="rect">
@@ -3353,8 +3353,8 @@
         </p:nvSpPr>
         <p:spPr>
           <a:xfrm>
-            <a:off x="4715434" y="2494838"/>
-            <a:ext cx="5136777" cy="3936016"/>
+            <a:off x="5029200" y="2512767"/>
+            <a:ext cx="4616824" cy="3936016"/>
           </a:xfrm>
           <a:prstGeom prst="rect">
             <a:avLst/>
@@ -3411,7 +3411,7 @@
         </p:nvSpPr>
         <p:spPr>
           <a:xfrm>
-            <a:off x="6190128" y="2845562"/>
+            <a:off x="6503893" y="2863491"/>
             <a:ext cx="1891553" cy="376185"/>
           </a:xfrm>
           <a:prstGeom prst="roundRect">
@@ -3493,7 +3493,7 @@
         </p:nvSpPr>
         <p:spPr>
           <a:xfrm>
-            <a:off x="6199138" y="3663535"/>
+            <a:off x="6512903" y="3681464"/>
             <a:ext cx="1891553" cy="376185"/>
           </a:xfrm>
           <a:prstGeom prst="roundRect">
@@ -3575,7 +3575,7 @@
         </p:nvSpPr>
         <p:spPr>
           <a:xfrm>
-            <a:off x="6514709" y="4462846"/>
+            <a:off x="6828474" y="4480775"/>
             <a:ext cx="1273857" cy="376185"/>
           </a:xfrm>
           <a:prstGeom prst="roundRect">
@@ -3657,7 +3657,7 @@
         </p:nvSpPr>
         <p:spPr>
           <a:xfrm>
-            <a:off x="4895049" y="4462846"/>
+            <a:off x="5208814" y="4480775"/>
             <a:ext cx="1273857" cy="376185"/>
           </a:xfrm>
           <a:prstGeom prst="roundRect">
@@ -3739,8 +3739,8 @@
         </p:nvSpPr>
         <p:spPr>
           <a:xfrm>
-            <a:off x="8125018" y="4443890"/>
-            <a:ext cx="1273857" cy="376185"/>
+            <a:off x="8438783" y="4461819"/>
+            <a:ext cx="1036911" cy="376185"/>
           </a:xfrm>
           <a:prstGeom prst="roundRect">
             <a:avLst/>
@@ -3835,7 +3835,7 @@
         </p:blipFill>
         <p:spPr>
           <a:xfrm>
-            <a:off x="6770755" y="5306588"/>
+            <a:off x="7084520" y="5324517"/>
             <a:ext cx="761496" cy="761496"/>
           </a:xfrm>
           <a:prstGeom prst="rect">
@@ -3857,7 +3857,7 @@
         </p:nvSpPr>
         <p:spPr>
           <a:xfrm>
-            <a:off x="6676076" y="6092866"/>
+            <a:off x="6989841" y="6110795"/>
             <a:ext cx="795618" cy="253916"/>
           </a:xfrm>
           <a:prstGeom prst="rect">
@@ -3906,7 +3906,7 @@
         </p:blipFill>
         <p:spPr>
           <a:xfrm>
-            <a:off x="5319992" y="5545102"/>
+            <a:off x="5633757" y="5563031"/>
             <a:ext cx="488633" cy="488633"/>
           </a:xfrm>
           <a:prstGeom prst="rect">
@@ -3928,7 +3928,7 @@
         </p:nvSpPr>
         <p:spPr>
           <a:xfrm>
-            <a:off x="4766375" y="6105336"/>
+            <a:off x="5080140" y="6123265"/>
             <a:ext cx="2072964" cy="253916"/>
           </a:xfrm>
           <a:prstGeom prst="rect">
@@ -3963,7 +3963,7 @@
         </p:nvCxnSpPr>
         <p:spPr>
           <a:xfrm>
-            <a:off x="5808625" y="5766318"/>
+            <a:off x="6122390" y="5784247"/>
             <a:ext cx="1030714" cy="0"/>
           </a:xfrm>
           <a:prstGeom prst="straightConnector1">
@@ -4002,7 +4002,7 @@
         </p:nvSpPr>
         <p:spPr>
           <a:xfrm>
-            <a:off x="6190128" y="5449078"/>
+            <a:off x="6503893" y="5467007"/>
             <a:ext cx="193249" cy="189717"/>
           </a:xfrm>
           <a:prstGeom prst="ellipse">
@@ -4054,9 +4054,9 @@
           <p:nvPr/>
         </p:nvCxnSpPr>
         <p:spPr>
-          <a:xfrm flipV="1">
-            <a:off x="2093257" y="2945025"/>
-            <a:ext cx="1204222" cy="10896"/>
+          <a:xfrm>
+            <a:off x="3203350" y="2962954"/>
+            <a:ext cx="685800" cy="0"/>
           </a:xfrm>
           <a:prstGeom prst="straightConnector1">
             <a:avLst/>
@@ -4094,7 +4094,7 @@
         </p:nvSpPr>
         <p:spPr>
           <a:xfrm>
-            <a:off x="2581833" y="2637469"/>
+            <a:off x="3377199" y="2673774"/>
             <a:ext cx="193249" cy="189717"/>
           </a:xfrm>
           <a:prstGeom prst="ellipse">
@@ -4145,7 +4145,7 @@
         </p:nvCxnSpPr>
         <p:spPr>
           <a:xfrm>
-            <a:off x="4211879" y="2968337"/>
+            <a:off x="4803550" y="2986266"/>
             <a:ext cx="1978249" cy="1"/>
           </a:xfrm>
           <a:prstGeom prst="bentConnector3">
@@ -4188,7 +4188,7 @@
         </p:nvCxnSpPr>
         <p:spPr>
           <a:xfrm>
-            <a:off x="7135905" y="3221747"/>
+            <a:off x="7449670" y="3239676"/>
             <a:ext cx="9010" cy="441788"/>
           </a:xfrm>
           <a:prstGeom prst="straightConnector1">
@@ -4231,7 +4231,7 @@
         </p:nvCxnSpPr>
         <p:spPr>
           <a:xfrm>
-            <a:off x="7144915" y="4039720"/>
+            <a:off x="7458680" y="4057649"/>
             <a:ext cx="6723" cy="423126"/>
           </a:xfrm>
           <a:prstGeom prst="straightConnector1">
@@ -4272,7 +4272,7 @@
         </p:nvCxnSpPr>
         <p:spPr>
           <a:xfrm rot="10800000" flipV="1">
-            <a:off x="5531979" y="3851626"/>
+            <a:off x="5845744" y="3869555"/>
             <a:ext cx="648819" cy="611219"/>
           </a:xfrm>
           <a:prstGeom prst="bentConnector2">
@@ -4307,6 +4307,7 @@
             </a:extLst>
           </p:cNvPr>
           <p:cNvCxnSpPr>
+            <a:cxnSpLocks/>
             <a:stCxn id="12" idx="3"/>
             <a:endCxn id="15" idx="0"/>
           </p:cNvCxnSpPr>
@@ -4314,8 +4315,8 @@
         </p:nvCxnSpPr>
         <p:spPr>
           <a:xfrm>
-            <a:off x="8090691" y="3851628"/>
-            <a:ext cx="671256" cy="592262"/>
+            <a:off x="8404456" y="3869557"/>
+            <a:ext cx="552783" cy="592262"/>
           </a:xfrm>
           <a:prstGeom prst="bentConnector2">
             <a:avLst/>
@@ -4355,7 +4356,7 @@
         </p:nvCxnSpPr>
         <p:spPr>
           <a:xfrm flipV="1">
-            <a:off x="7471694" y="3221747"/>
+            <a:off x="7785459" y="3239676"/>
             <a:ext cx="0" cy="441788"/>
           </a:xfrm>
           <a:prstGeom prst="straightConnector1">
@@ -4398,7 +4399,7 @@
         </p:nvCxnSpPr>
         <p:spPr>
           <a:xfrm>
-            <a:off x="6168906" y="4650939"/>
+            <a:off x="6482671" y="4668868"/>
             <a:ext cx="345803" cy="0"/>
           </a:xfrm>
           <a:prstGeom prst="straightConnector1">
@@ -4439,7 +4440,7 @@
         </p:nvCxnSpPr>
         <p:spPr>
           <a:xfrm rot="5400000">
-            <a:off x="6824304" y="4654706"/>
+            <a:off x="7138069" y="4672635"/>
             <a:ext cx="1749699" cy="519727"/>
           </a:xfrm>
           <a:prstGeom prst="bentConnector3">
@@ -4485,7 +4486,7 @@
         </p:nvCxnSpPr>
         <p:spPr>
           <a:xfrm flipH="1">
-            <a:off x="7151503" y="4839031"/>
+            <a:off x="7465268" y="4856960"/>
             <a:ext cx="135" cy="467557"/>
           </a:xfrm>
           <a:prstGeom prst="straightConnector1">
@@ -4524,7 +4525,7 @@
         </p:nvSpPr>
         <p:spPr>
           <a:xfrm>
-            <a:off x="5259532" y="2714928"/>
+            <a:off x="5573297" y="2732857"/>
             <a:ext cx="193249" cy="189717"/>
           </a:xfrm>
           <a:prstGeom prst="ellipse">
@@ -4573,7 +4574,7 @@
         </p:nvSpPr>
         <p:spPr>
           <a:xfrm>
-            <a:off x="6875891" y="3343533"/>
+            <a:off x="7189656" y="3361462"/>
             <a:ext cx="193249" cy="189717"/>
           </a:xfrm>
           <a:prstGeom prst="ellipse">
@@ -4622,7 +4623,7 @@
         </p:nvSpPr>
         <p:spPr>
           <a:xfrm>
-            <a:off x="6909588" y="4121166"/>
+            <a:off x="7223353" y="4139095"/>
             <a:ext cx="193249" cy="189717"/>
           </a:xfrm>
           <a:prstGeom prst="ellipse">
@@ -4671,7 +4672,7 @@
         </p:nvSpPr>
         <p:spPr>
           <a:xfrm>
-            <a:off x="6912587" y="4943818"/>
+            <a:off x="7226352" y="4961747"/>
             <a:ext cx="193249" cy="189717"/>
           </a:xfrm>
           <a:prstGeom prst="ellipse">
@@ -4720,7 +4721,7 @@
         </p:nvSpPr>
         <p:spPr>
           <a:xfrm>
-            <a:off x="5775734" y="3620733"/>
+            <a:off x="6089499" y="3638662"/>
             <a:ext cx="193249" cy="189717"/>
           </a:xfrm>
           <a:prstGeom prst="ellipse">
@@ -4769,7 +4770,7 @@
         </p:nvSpPr>
         <p:spPr>
           <a:xfrm>
-            <a:off x="7969999" y="5276049"/>
+            <a:off x="8283764" y="5293978"/>
             <a:ext cx="772875" cy="415498"/>
           </a:xfrm>
           <a:prstGeom prst="rect">
@@ -4804,7 +4805,7 @@
         </p:nvSpPr>
         <p:spPr>
           <a:xfrm>
-            <a:off x="8874826" y="3944861"/>
+            <a:off x="9188591" y="3962790"/>
             <a:ext cx="193249" cy="189717"/>
           </a:xfrm>
           <a:prstGeom prst="ellipse">
@@ -4853,7 +4854,7 @@
         </p:nvSpPr>
         <p:spPr>
           <a:xfrm>
-            <a:off x="7551845" y="3352747"/>
+            <a:off x="7865610" y="3370676"/>
             <a:ext cx="193249" cy="189717"/>
           </a:xfrm>
           <a:prstGeom prst="ellipse">

</xml_diff>